<commit_message>
Fixed ordering on slides
</commit_message>
<xml_diff>
--- a/final_project/Multi-Pong.pptx
+++ b/final_project/Multi-Pong.pptx
@@ -8,10 +8,9 @@
     <p:sldId id="256" r:id="rId5"/>
     <p:sldId id="262" r:id="rId6"/>
     <p:sldId id="263" r:id="rId7"/>
-    <p:sldId id="265" r:id="rId8"/>
-    <p:sldId id="264" r:id="rId9"/>
-    <p:sldId id="266" r:id="rId10"/>
-    <p:sldId id="267" r:id="rId11"/>
+    <p:sldId id="266" r:id="rId8"/>
+    <p:sldId id="265" r:id="rId9"/>
+    <p:sldId id="264" r:id="rId10"/>
   </p:sldIdLst>
   <p:sldSz cx="12192000" cy="6858000"/>
   <p:notesSz cx="6858000" cy="9144000"/>
@@ -116,6 +115,14 @@
     </p:ext>
   </p:extLst>
 </p:presentation>
+</file>
+
+<file path=ppt/revisionInfo.xml><?xml version="1.0" encoding="utf-8"?>
+<p1510:revInfo xmlns:a="http://schemas.openxmlformats.org/drawingml/2006/main" xmlns:r="http://schemas.openxmlformats.org/officeDocument/2006/relationships" xmlns:p1510="http://schemas.microsoft.com/office/powerpoint/2015/10/main">
+  <p1510:revLst>
+    <p1510:client id="{509D61D3-011D-4284-A27A-7B89057D061E}" v="3" dt="2022-12-01T15:02:04.769"/>
+  </p1510:revLst>
+</p1510:revInfo>
 </file>
 
 <file path=ppt/slideLayouts/slideLayout1.xml><?xml version="1.0" encoding="utf-8"?>
@@ -923,7 +930,7 @@
           <a:p>
             <a:fld id="{7CF0BCE0-945C-4FDF-95A1-2149B1FF5B83}" type="datetimeFigureOut">
               <a:rPr lang="en-US" smtClean="0"/>
-              <a:t>12/5/2022</a:t>
+              <a:t>12/6/2022</a:t>
             </a:fld>
             <a:endParaRPr lang="en-US"/>
           </a:p>
@@ -1650,7 +1657,7 @@
           <a:p>
             <a:fld id="{7CF0BCE0-945C-4FDF-95A1-2149B1FF5B83}" type="datetimeFigureOut">
               <a:rPr lang="en-US" smtClean="0"/>
-              <a:t>12/5/2022</a:t>
+              <a:t>12/6/2022</a:t>
             </a:fld>
             <a:endParaRPr lang="en-US"/>
           </a:p>
@@ -2523,7 +2530,7 @@
           <a:p>
             <a:fld id="{7CF0BCE0-945C-4FDF-95A1-2149B1FF5B83}" type="datetimeFigureOut">
               <a:rPr lang="en-US" smtClean="0"/>
-              <a:t>12/5/2022</a:t>
+              <a:t>12/6/2022</a:t>
             </a:fld>
             <a:endParaRPr lang="en-US"/>
           </a:p>
@@ -3227,7 +3234,7 @@
           <a:p>
             <a:fld id="{7CF0BCE0-945C-4FDF-95A1-2149B1FF5B83}" type="datetimeFigureOut">
               <a:rPr lang="en-US" smtClean="0"/>
-              <a:t>12/5/2022</a:t>
+              <a:t>12/6/2022</a:t>
             </a:fld>
             <a:endParaRPr lang="en-US"/>
           </a:p>
@@ -3937,7 +3944,7 @@
           <a:p>
             <a:fld id="{7CF0BCE0-945C-4FDF-95A1-2149B1FF5B83}" type="datetimeFigureOut">
               <a:rPr lang="en-US" smtClean="0"/>
-              <a:t>12/5/2022</a:t>
+              <a:t>12/6/2022</a:t>
             </a:fld>
             <a:endParaRPr lang="en-US" dirty="0"/>
           </a:p>
@@ -4874,7 +4881,7 @@
           <a:p>
             <a:fld id="{7CF0BCE0-945C-4FDF-95A1-2149B1FF5B83}" type="datetimeFigureOut">
               <a:rPr lang="en-US" smtClean="0"/>
-              <a:t>12/5/2022</a:t>
+              <a:t>12/6/2022</a:t>
             </a:fld>
             <a:endParaRPr lang="en-US"/>
           </a:p>
@@ -6094,7 +6101,7 @@
           <a:p>
             <a:fld id="{7CF0BCE0-945C-4FDF-95A1-2149B1FF5B83}" type="datetimeFigureOut">
               <a:rPr lang="en-US" smtClean="0"/>
-              <a:t>12/5/2022</a:t>
+              <a:t>12/6/2022</a:t>
             </a:fld>
             <a:endParaRPr lang="en-US"/>
           </a:p>
@@ -6760,7 +6767,7 @@
           <a:p>
             <a:fld id="{7CF0BCE0-945C-4FDF-95A1-2149B1FF5B83}" type="datetimeFigureOut">
               <a:rPr lang="en-US" smtClean="0"/>
-              <a:t>12/5/2022</a:t>
+              <a:t>12/6/2022</a:t>
             </a:fld>
             <a:endParaRPr lang="en-US"/>
           </a:p>
@@ -7529,7 +7536,7 @@
           <a:p>
             <a:fld id="{7CF0BCE0-945C-4FDF-95A1-2149B1FF5B83}" type="datetimeFigureOut">
               <a:rPr lang="en-US" smtClean="0"/>
-              <a:t>12/5/2022</a:t>
+              <a:t>12/6/2022</a:t>
             </a:fld>
             <a:endParaRPr lang="en-US"/>
           </a:p>
@@ -8641,7 +8648,7 @@
           <a:p>
             <a:fld id="{7CF0BCE0-945C-4FDF-95A1-2149B1FF5B83}" type="datetimeFigureOut">
               <a:rPr lang="en-US" smtClean="0"/>
-              <a:t>12/5/2022</a:t>
+              <a:t>12/6/2022</a:t>
             </a:fld>
             <a:endParaRPr lang="en-US"/>
           </a:p>
@@ -9449,7 +9456,7 @@
           <a:p>
             <a:fld id="{7CF0BCE0-945C-4FDF-95A1-2149B1FF5B83}" type="datetimeFigureOut">
               <a:rPr lang="en-US" smtClean="0"/>
-              <a:t>12/5/2022</a:t>
+              <a:t>12/6/2022</a:t>
             </a:fld>
             <a:endParaRPr lang="en-US"/>
           </a:p>
@@ -9733,7 +9740,7 @@
             <a:fld id="{7CF0BCE0-945C-4FDF-95A1-2149B1FF5B83}" type="datetimeFigureOut">
               <a:rPr lang="en-US" smtClean="0"/>
               <a:pPr algn="r"/>
-              <a:t>12/5/2022</a:t>
+              <a:t>12/6/2022</a:t>
             </a:fld>
             <a:endParaRPr lang="en-US" dirty="0"/>
           </a:p>
@@ -12928,6 +12935,116 @@
 <file path=ppt/slides/slide4.xml><?xml version="1.0" encoding="utf-8"?>
 <p:sld xmlns:a="http://schemas.openxmlformats.org/drawingml/2006/main" xmlns:r="http://schemas.openxmlformats.org/officeDocument/2006/relationships" xmlns:p="http://schemas.openxmlformats.org/presentationml/2006/main">
   <p:cSld>
+    <p:spTree>
+      <p:nvGrpSpPr>
+        <p:cNvPr id="1" name=""/>
+        <p:cNvGrpSpPr/>
+        <p:nvPr/>
+      </p:nvGrpSpPr>
+      <p:grpSpPr>
+        <a:xfrm>
+          <a:off x="0" y="0"/>
+          <a:ext cx="0" cy="0"/>
+          <a:chOff x="0" y="0"/>
+          <a:chExt cx="0" cy="0"/>
+        </a:xfrm>
+      </p:grpSpPr>
+      <p:sp>
+        <p:nvSpPr>
+          <p:cNvPr id="2" name="Title 1">
+            <a:extLst>
+              <a:ext uri="{FF2B5EF4-FFF2-40B4-BE49-F238E27FC236}">
+                <a16:creationId xmlns:a16="http://schemas.microsoft.com/office/drawing/2014/main" id="{654F91AE-6BB5-31CA-7AB6-574E1885F7D3}"/>
+              </a:ext>
+            </a:extLst>
+          </p:cNvPr>
+          <p:cNvSpPr>
+            <a:spLocks noGrp="1"/>
+          </p:cNvSpPr>
+          <p:nvPr>
+            <p:ph type="title"/>
+          </p:nvPr>
+        </p:nvSpPr>
+        <p:spPr/>
+        <p:txBody>
+          <a:bodyPr/>
+          <a:lstStyle/>
+          <a:p>
+            <a:r>
+              <a:rPr lang="en-US" dirty="0"/>
+              <a:t>Implementation</a:t>
+            </a:r>
+          </a:p>
+        </p:txBody>
+      </p:sp>
+      <p:sp>
+        <p:nvSpPr>
+          <p:cNvPr id="3" name="Content Placeholder 2">
+            <a:extLst>
+              <a:ext uri="{FF2B5EF4-FFF2-40B4-BE49-F238E27FC236}">
+                <a16:creationId xmlns:a16="http://schemas.microsoft.com/office/drawing/2014/main" id="{8EE923AD-52C8-7EBA-BAD7-553165770049}"/>
+              </a:ext>
+            </a:extLst>
+          </p:cNvPr>
+          <p:cNvSpPr>
+            <a:spLocks noGrp="1"/>
+          </p:cNvSpPr>
+          <p:nvPr>
+            <p:ph idx="1"/>
+          </p:nvPr>
+        </p:nvSpPr>
+        <p:spPr/>
+        <p:txBody>
+          <a:bodyPr/>
+          <a:lstStyle/>
+          <a:p>
+            <a:r>
+              <a:rPr lang="en-US" dirty="0"/>
+              <a:t>Positional data</a:t>
+            </a:r>
+          </a:p>
+          <a:p>
+            <a:r>
+              <a:rPr lang="en-US" dirty="0"/>
+              <a:t>Moving Paddles</a:t>
+            </a:r>
+          </a:p>
+          <a:p>
+            <a:r>
+              <a:rPr lang="en-US" dirty="0"/>
+              <a:t>Multiple balls bouncing</a:t>
+            </a:r>
+          </a:p>
+          <a:p>
+            <a:r>
+              <a:rPr lang="en-US" dirty="0"/>
+              <a:t>Random ball colors</a:t>
+            </a:r>
+          </a:p>
+          <a:p>
+            <a:r>
+              <a:rPr lang="en-US" dirty="0"/>
+              <a:t>Collisions</a:t>
+            </a:r>
+          </a:p>
+        </p:txBody>
+      </p:sp>
+    </p:spTree>
+    <p:extLst>
+      <p:ext uri="{BB962C8B-B14F-4D97-AF65-F5344CB8AC3E}">
+        <p14:creationId xmlns:p14="http://schemas.microsoft.com/office/powerpoint/2010/main" val="2539906178"/>
+      </p:ext>
+    </p:extLst>
+  </p:cSld>
+  <p:clrMapOvr>
+    <a:masterClrMapping/>
+  </p:clrMapOvr>
+</p:sld>
+</file>
+
+<file path=ppt/slides/slide5.xml><?xml version="1.0" encoding="utf-8"?>
+<p:sld xmlns:a="http://schemas.openxmlformats.org/drawingml/2006/main" xmlns:r="http://schemas.openxmlformats.org/officeDocument/2006/relationships" xmlns:p="http://schemas.openxmlformats.org/presentationml/2006/main">
+  <p:cSld>
     <p:bg>
       <p:bgPr>
         <a:solidFill>
@@ -14649,7 +14766,7 @@
 </p:sld>
 </file>
 
-<file path=ppt/slides/slide5.xml><?xml version="1.0" encoding="utf-8"?>
+<file path=ppt/slides/slide6.xml><?xml version="1.0" encoding="utf-8"?>
 <p:sld xmlns:a="http://schemas.openxmlformats.org/drawingml/2006/main" xmlns:r="http://schemas.openxmlformats.org/officeDocument/2006/relationships" xmlns:p="http://schemas.openxmlformats.org/presentationml/2006/main">
   <p:cSld>
     <p:bg>
@@ -16402,1465 +16519,6 @@
 </p:sld>
 </file>
 
-<file path=ppt/slides/slide6.xml><?xml version="1.0" encoding="utf-8"?>
-<p:sld xmlns:a="http://schemas.openxmlformats.org/drawingml/2006/main" xmlns:r="http://schemas.openxmlformats.org/officeDocument/2006/relationships" xmlns:p="http://schemas.openxmlformats.org/presentationml/2006/main">
-  <p:cSld>
-    <p:spTree>
-      <p:nvGrpSpPr>
-        <p:cNvPr id="1" name=""/>
-        <p:cNvGrpSpPr/>
-        <p:nvPr/>
-      </p:nvGrpSpPr>
-      <p:grpSpPr>
-        <a:xfrm>
-          <a:off x="0" y="0"/>
-          <a:ext cx="0" cy="0"/>
-          <a:chOff x="0" y="0"/>
-          <a:chExt cx="0" cy="0"/>
-        </a:xfrm>
-      </p:grpSpPr>
-      <p:sp>
-        <p:nvSpPr>
-          <p:cNvPr id="2" name="Title 1">
-            <a:extLst>
-              <a:ext uri="{FF2B5EF4-FFF2-40B4-BE49-F238E27FC236}">
-                <a16:creationId xmlns:a16="http://schemas.microsoft.com/office/drawing/2014/main" id="{654F91AE-6BB5-31CA-7AB6-574E1885F7D3}"/>
-              </a:ext>
-            </a:extLst>
-          </p:cNvPr>
-          <p:cNvSpPr>
-            <a:spLocks noGrp="1"/>
-          </p:cNvSpPr>
-          <p:nvPr>
-            <p:ph type="title"/>
-          </p:nvPr>
-        </p:nvSpPr>
-        <p:spPr/>
-        <p:txBody>
-          <a:bodyPr/>
-          <a:lstStyle/>
-          <a:p>
-            <a:r>
-              <a:rPr lang="en-US" dirty="0"/>
-              <a:t>Implementation</a:t>
-            </a:r>
-          </a:p>
-        </p:txBody>
-      </p:sp>
-      <p:sp>
-        <p:nvSpPr>
-          <p:cNvPr id="3" name="Content Placeholder 2">
-            <a:extLst>
-              <a:ext uri="{FF2B5EF4-FFF2-40B4-BE49-F238E27FC236}">
-                <a16:creationId xmlns:a16="http://schemas.microsoft.com/office/drawing/2014/main" id="{8EE923AD-52C8-7EBA-BAD7-553165770049}"/>
-              </a:ext>
-            </a:extLst>
-          </p:cNvPr>
-          <p:cNvSpPr>
-            <a:spLocks noGrp="1"/>
-          </p:cNvSpPr>
-          <p:nvPr>
-            <p:ph idx="1"/>
-          </p:nvPr>
-        </p:nvSpPr>
-        <p:spPr/>
-        <p:txBody>
-          <a:bodyPr/>
-          <a:lstStyle/>
-          <a:p>
-            <a:r>
-              <a:rPr lang="en-US" dirty="0"/>
-              <a:t>Positional data</a:t>
-            </a:r>
-          </a:p>
-          <a:p>
-            <a:r>
-              <a:rPr lang="en-US" dirty="0"/>
-              <a:t>Moving Paddles</a:t>
-            </a:r>
-          </a:p>
-          <a:p>
-            <a:r>
-              <a:rPr lang="en-US" dirty="0"/>
-              <a:t>Multiple balls bouncing</a:t>
-            </a:r>
-          </a:p>
-          <a:p>
-            <a:r>
-              <a:rPr lang="en-US" dirty="0"/>
-              <a:t>Random ball colors</a:t>
-            </a:r>
-          </a:p>
-          <a:p>
-            <a:r>
-              <a:rPr lang="en-US" dirty="0"/>
-              <a:t>Collisions</a:t>
-            </a:r>
-          </a:p>
-        </p:txBody>
-      </p:sp>
-    </p:spTree>
-    <p:extLst>
-      <p:ext uri="{BB962C8B-B14F-4D97-AF65-F5344CB8AC3E}">
-        <p14:creationId xmlns:p14="http://schemas.microsoft.com/office/powerpoint/2010/main" val="2539906178"/>
-      </p:ext>
-    </p:extLst>
-  </p:cSld>
-  <p:clrMapOvr>
-    <a:masterClrMapping/>
-  </p:clrMapOvr>
-</p:sld>
-</file>
-
-<file path=ppt/slides/slide7.xml><?xml version="1.0" encoding="utf-8"?>
-<p:sld xmlns:a="http://schemas.openxmlformats.org/drawingml/2006/main" xmlns:r="http://schemas.openxmlformats.org/officeDocument/2006/relationships" xmlns:p="http://schemas.openxmlformats.org/presentationml/2006/main">
-  <p:cSld>
-    <p:bg>
-      <p:bgPr>
-        <a:solidFill>
-          <a:schemeClr val="bg1"/>
-        </a:solidFill>
-        <a:effectLst/>
-      </p:bgPr>
-    </p:bg>
-    <p:spTree>
-      <p:nvGrpSpPr>
-        <p:cNvPr id="1" name=""/>
-        <p:cNvGrpSpPr/>
-        <p:nvPr/>
-      </p:nvGrpSpPr>
-      <p:grpSpPr>
-        <a:xfrm>
-          <a:off x="0" y="0"/>
-          <a:ext cx="0" cy="0"/>
-          <a:chOff x="0" y="0"/>
-          <a:chExt cx="0" cy="0"/>
-        </a:xfrm>
-      </p:grpSpPr>
-      <p:grpSp>
-        <p:nvGrpSpPr>
-          <p:cNvPr id="7" name="Group 6">
-            <a:extLst>
-              <a:ext uri="{FF2B5EF4-FFF2-40B4-BE49-F238E27FC236}">
-                <a16:creationId xmlns:a16="http://schemas.microsoft.com/office/drawing/2014/main" id="{BF4E480B-94D6-46F9-A2B6-B98D311FDC19}"/>
-              </a:ext>
-              <a:ext uri="{C183D7F6-B498-43B3-948B-1728B52AA6E4}">
-                <adec:decorative xmlns:adec="http://schemas.microsoft.com/office/drawing/2017/decorative" val="1"/>
-              </a:ext>
-            </a:extLst>
-          </p:cNvPr>
-          <p:cNvGrpSpPr>
-            <a:grpSpLocks noGrp="1" noUngrp="1" noRot="1" noChangeAspect="1" noMove="1" noResize="1"/>
-          </p:cNvGrpSpPr>
-          <p:nvPr>
-            <p:extLst>
-              <p:ext uri="{386F3935-93C4-4BCD-93E2-E3B085C9AB24}">
-                <p16:designElem xmlns:p16="http://schemas.microsoft.com/office/powerpoint/2015/main" val="1"/>
-              </p:ext>
-            </p:extLst>
-          </p:nvPr>
-        </p:nvGrpSpPr>
-        <p:grpSpPr>
-          <a:xfrm>
-            <a:off x="0" y="0"/>
-            <a:ext cx="12191999" cy="6861600"/>
-            <a:chOff x="1" y="0"/>
-            <a:chExt cx="12191999" cy="6861600"/>
-          </a:xfrm>
-        </p:grpSpPr>
-        <p:sp>
-          <p:nvSpPr>
-            <p:cNvPr id="8" name="Rectangle 7">
-              <a:extLst>
-                <a:ext uri="{FF2B5EF4-FFF2-40B4-BE49-F238E27FC236}">
-                  <a16:creationId xmlns:a16="http://schemas.microsoft.com/office/drawing/2014/main" id="{07183CDE-91A1-40C3-8E80-66F89E1C2D53}"/>
-                </a:ext>
-                <a:ext uri="{C183D7F6-B498-43B3-948B-1728B52AA6E4}">
-                  <adec:decorative xmlns:adec="http://schemas.microsoft.com/office/drawing/2017/decorative" val="1"/>
-                </a:ext>
-              </a:extLst>
-            </p:cNvPr>
-            <p:cNvSpPr>
-              <a:spLocks noChangeAspect="1"/>
-            </p:cNvSpPr>
-            <p:nvPr>
-              <p:extLst>
-                <p:ext uri="{386F3935-93C4-4BCD-93E2-E3B085C9AB24}">
-                  <p16:designElem xmlns:p16="http://schemas.microsoft.com/office/powerpoint/2015/main" val="1"/>
-                </p:ext>
-              </p:extLst>
-            </p:nvPr>
-          </p:nvSpPr>
-          <p:spPr>
-            <a:xfrm rot="16200000">
-              <a:off x="1" y="1640114"/>
-              <a:ext cx="5217886" cy="5217886"/>
-            </a:xfrm>
-            <a:prstGeom prst="rect">
-              <a:avLst/>
-            </a:prstGeom>
-            <a:gradFill flip="none" rotWithShape="1">
-              <a:gsLst>
-                <a:gs pos="0">
-                  <a:schemeClr val="accent2">
-                    <a:alpha val="60000"/>
-                  </a:schemeClr>
-                </a:gs>
-                <a:gs pos="60000">
-                  <a:schemeClr val="accent2">
-                    <a:alpha val="0"/>
-                  </a:schemeClr>
-                </a:gs>
-              </a:gsLst>
-              <a:path path="circle">
-                <a:fillToRect r="100000" b="100000"/>
-              </a:path>
-              <a:tileRect l="-100000" t="-100000"/>
-            </a:gradFill>
-            <a:ln w="12700" cap="flat" cmpd="sng" algn="ctr">
-              <a:noFill/>
-              <a:prstDash val="solid"/>
-              <a:miter lim="800000"/>
-            </a:ln>
-            <a:effectLst/>
-          </p:spPr>
-          <p:style>
-            <a:lnRef idx="2">
-              <a:schemeClr val="accent1">
-                <a:shade val="50000"/>
-              </a:schemeClr>
-            </a:lnRef>
-            <a:fillRef idx="1">
-              <a:schemeClr val="accent1"/>
-            </a:fillRef>
-            <a:effectRef idx="0">
-              <a:schemeClr val="accent1"/>
-            </a:effectRef>
-            <a:fontRef idx="minor">
-              <a:schemeClr val="lt1"/>
-            </a:fontRef>
-          </p:style>
-          <p:txBody>
-            <a:bodyPr rtlCol="0" anchor="ctr"/>
-            <a:lstStyle/>
-            <a:p>
-              <a:pPr algn="r"/>
-              <a:endParaRPr lang="en-US"/>
-            </a:p>
-          </p:txBody>
-        </p:sp>
-        <p:sp>
-          <p:nvSpPr>
-            <p:cNvPr id="9" name="Oval 8">
-              <a:extLst>
-                <a:ext uri="{FF2B5EF4-FFF2-40B4-BE49-F238E27FC236}">
-                  <a16:creationId xmlns:a16="http://schemas.microsoft.com/office/drawing/2014/main" id="{A6756515-F9AA-46BD-8DD2-AA15BA492AC0}"/>
-                </a:ext>
-                <a:ext uri="{C183D7F6-B498-43B3-948B-1728B52AA6E4}">
-                  <adec:decorative xmlns:adec="http://schemas.microsoft.com/office/drawing/2017/decorative" val="1"/>
-                </a:ext>
-              </a:extLst>
-            </p:cNvPr>
-            <p:cNvSpPr>
-              <a:spLocks noChangeAspect="1"/>
-            </p:cNvSpPr>
-            <p:nvPr>
-              <p:extLst>
-                <p:ext uri="{386F3935-93C4-4BCD-93E2-E3B085C9AB24}">
-                  <p16:designElem xmlns:p16="http://schemas.microsoft.com/office/powerpoint/2015/main" val="1"/>
-                </p:ext>
-              </p:extLst>
-            </p:nvPr>
-          </p:nvSpPr>
-          <p:spPr>
-            <a:xfrm>
-              <a:off x="6384514" y="0"/>
-              <a:ext cx="4320000" cy="4320000"/>
-            </a:xfrm>
-            <a:prstGeom prst="ellipse">
-              <a:avLst/>
-            </a:prstGeom>
-            <a:solidFill>
-              <a:schemeClr val="accent3">
-                <a:alpha val="96000"/>
-              </a:schemeClr>
-            </a:solidFill>
-            <a:ln>
-              <a:noFill/>
-            </a:ln>
-            <a:effectLst>
-              <a:softEdge rad="1016000"/>
-            </a:effectLst>
-          </p:spPr>
-          <p:style>
-            <a:lnRef idx="2">
-              <a:schemeClr val="accent1">
-                <a:shade val="50000"/>
-              </a:schemeClr>
-            </a:lnRef>
-            <a:fillRef idx="1">
-              <a:schemeClr val="accent1"/>
-            </a:fillRef>
-            <a:effectRef idx="0">
-              <a:schemeClr val="accent1"/>
-            </a:effectRef>
-            <a:fontRef idx="minor">
-              <a:schemeClr val="lt1"/>
-            </a:fontRef>
-          </p:style>
-          <p:txBody>
-            <a:bodyPr rtlCol="0" anchor="ctr"/>
-            <a:lstStyle/>
-            <a:p>
-              <a:pPr algn="r"/>
-              <a:endParaRPr lang="en-US"/>
-            </a:p>
-          </p:txBody>
-        </p:sp>
-        <p:sp>
-          <p:nvSpPr>
-            <p:cNvPr id="10" name="Oval 9">
-              <a:extLst>
-                <a:ext uri="{FF2B5EF4-FFF2-40B4-BE49-F238E27FC236}">
-                  <a16:creationId xmlns:a16="http://schemas.microsoft.com/office/drawing/2014/main" id="{ABA365E2-8B71-408B-9092-0104216AC7AC}"/>
-                </a:ext>
-                <a:ext uri="{C183D7F6-B498-43B3-948B-1728B52AA6E4}">
-                  <adec:decorative xmlns:adec="http://schemas.microsoft.com/office/drawing/2017/decorative" val="1"/>
-                </a:ext>
-              </a:extLst>
-            </p:cNvPr>
-            <p:cNvSpPr>
-              <a:spLocks noChangeAspect="1"/>
-            </p:cNvSpPr>
-            <p:nvPr>
-              <p:extLst>
-                <p:ext uri="{386F3935-93C4-4BCD-93E2-E3B085C9AB24}">
-                  <p16:designElem xmlns:p16="http://schemas.microsoft.com/office/powerpoint/2015/main" val="1"/>
-                </p:ext>
-              </p:extLst>
-            </p:nvPr>
-          </p:nvSpPr>
-          <p:spPr>
-            <a:xfrm>
-              <a:off x="6119057" y="1230054"/>
-              <a:ext cx="5506886" cy="5506886"/>
-            </a:xfrm>
-            <a:prstGeom prst="ellipse">
-              <a:avLst/>
-            </a:prstGeom>
-            <a:solidFill>
-              <a:schemeClr val="accent2">
-                <a:alpha val="60000"/>
-              </a:schemeClr>
-            </a:solidFill>
-            <a:ln>
-              <a:noFill/>
-            </a:ln>
-            <a:effectLst>
-              <a:softEdge rad="1270000"/>
-            </a:effectLst>
-          </p:spPr>
-          <p:style>
-            <a:lnRef idx="2">
-              <a:schemeClr val="accent1">
-                <a:shade val="50000"/>
-              </a:schemeClr>
-            </a:lnRef>
-            <a:fillRef idx="1">
-              <a:schemeClr val="accent1"/>
-            </a:fillRef>
-            <a:effectRef idx="0">
-              <a:schemeClr val="accent1"/>
-            </a:effectRef>
-            <a:fontRef idx="minor">
-              <a:schemeClr val="lt1"/>
-            </a:fontRef>
-          </p:style>
-          <p:txBody>
-            <a:bodyPr rtlCol="0" anchor="ctr"/>
-            <a:lstStyle/>
-            <a:p>
-              <a:pPr algn="r"/>
-              <a:endParaRPr lang="en-US" dirty="0"/>
-            </a:p>
-          </p:txBody>
-        </p:sp>
-        <p:grpSp>
-          <p:nvGrpSpPr>
-            <p:cNvPr id="11" name="Group 10">
-              <a:extLst>
-                <a:ext uri="{FF2B5EF4-FFF2-40B4-BE49-F238E27FC236}">
-                  <a16:creationId xmlns:a16="http://schemas.microsoft.com/office/drawing/2014/main" id="{BEDB8D7A-1BF6-4CDB-B93A-7736955F5043}"/>
-                </a:ext>
-                <a:ext uri="{C183D7F6-B498-43B3-948B-1728B52AA6E4}">
-                  <adec:decorative xmlns:adec="http://schemas.microsoft.com/office/drawing/2017/decorative" val="1"/>
-                </a:ext>
-              </a:extLst>
-            </p:cNvPr>
-            <p:cNvGrpSpPr>
-              <a:grpSpLocks noChangeAspect="1"/>
-            </p:cNvGrpSpPr>
-            <p:nvPr>
-              <p:extLst>
-                <p:ext uri="{386F3935-93C4-4BCD-93E2-E3B085C9AB24}">
-                  <p16:designElem xmlns:p16="http://schemas.microsoft.com/office/powerpoint/2015/main" val="1"/>
-                </p:ext>
-              </p:extLst>
-            </p:nvPr>
-          </p:nvGrpSpPr>
-          <p:grpSpPr>
-            <a:xfrm>
-              <a:off x="690092" y="0"/>
-              <a:ext cx="10800000" cy="6858000"/>
-              <a:chOff x="2328000" y="0"/>
-              <a:chExt cx="2880000" cy="1440000"/>
-            </a:xfrm>
-          </p:grpSpPr>
-          <p:sp>
-            <p:nvSpPr>
-              <p:cNvPr id="16" name="Rectangle 15">
-                <a:extLst>
-                  <a:ext uri="{FF2B5EF4-FFF2-40B4-BE49-F238E27FC236}">
-                    <a16:creationId xmlns:a16="http://schemas.microsoft.com/office/drawing/2014/main" id="{5AACD774-5167-46C7-8A62-6E2FE4BE9469}"/>
-                  </a:ext>
-                  <a:ext uri="{C183D7F6-B498-43B3-948B-1728B52AA6E4}">
-                    <adec:decorative xmlns:adec="http://schemas.microsoft.com/office/drawing/2017/decorative" val="1"/>
-                  </a:ext>
-                </a:extLst>
-              </p:cNvPr>
-              <p:cNvSpPr/>
-              <p:nvPr>
-                <p:extLst>
-                  <p:ext uri="{386F3935-93C4-4BCD-93E2-E3B085C9AB24}">
-                    <p16:designElem xmlns:p16="http://schemas.microsoft.com/office/powerpoint/2015/main" val="1"/>
-                  </p:ext>
-                </p:extLst>
-              </p:nvPr>
-            </p:nvSpPr>
-            <p:spPr>
-              <a:xfrm>
-                <a:off x="3768000" y="0"/>
-                <a:ext cx="1440000" cy="1440000"/>
-              </a:xfrm>
-              <a:prstGeom prst="rect">
-                <a:avLst/>
-              </a:prstGeom>
-              <a:gradFill flip="none" rotWithShape="1">
-                <a:gsLst>
-                  <a:gs pos="0">
-                    <a:schemeClr val="accent1"/>
-                  </a:gs>
-                  <a:gs pos="60000">
-                    <a:schemeClr val="accent1">
-                      <a:alpha val="0"/>
-                    </a:schemeClr>
-                  </a:gs>
-                </a:gsLst>
-                <a:path path="circle">
-                  <a:fillToRect r="100000" b="100000"/>
-                </a:path>
-                <a:tileRect l="-100000" t="-100000"/>
-              </a:gradFill>
-              <a:ln w="12700" cap="flat" cmpd="sng" algn="ctr">
-                <a:noFill/>
-                <a:prstDash val="solid"/>
-                <a:miter lim="800000"/>
-              </a:ln>
-              <a:effectLst/>
-            </p:spPr>
-            <p:style>
-              <a:lnRef idx="2">
-                <a:schemeClr val="accent1">
-                  <a:shade val="50000"/>
-                </a:schemeClr>
-              </a:lnRef>
-              <a:fillRef idx="1">
-                <a:schemeClr val="accent1"/>
-              </a:fillRef>
-              <a:effectRef idx="0">
-                <a:schemeClr val="accent1"/>
-              </a:effectRef>
-              <a:fontRef idx="minor">
-                <a:schemeClr val="lt1"/>
-              </a:fontRef>
-            </p:style>
-            <p:txBody>
-              <a:bodyPr rtlCol="0" anchor="ctr"/>
-              <a:lstStyle/>
-              <a:p>
-                <a:pPr algn="r"/>
-                <a:endParaRPr lang="en-US"/>
-              </a:p>
-            </p:txBody>
-          </p:sp>
-          <p:sp>
-            <p:nvSpPr>
-              <p:cNvPr id="17" name="Rectangle 16">
-                <a:extLst>
-                  <a:ext uri="{FF2B5EF4-FFF2-40B4-BE49-F238E27FC236}">
-                    <a16:creationId xmlns:a16="http://schemas.microsoft.com/office/drawing/2014/main" id="{06E0F2D8-452E-48F9-9912-C47EAEAE1802}"/>
-                  </a:ext>
-                  <a:ext uri="{C183D7F6-B498-43B3-948B-1728B52AA6E4}">
-                    <adec:decorative xmlns:adec="http://schemas.microsoft.com/office/drawing/2017/decorative" val="1"/>
-                  </a:ext>
-                </a:extLst>
-              </p:cNvPr>
-              <p:cNvSpPr/>
-              <p:nvPr>
-                <p:extLst>
-                  <p:ext uri="{386F3935-93C4-4BCD-93E2-E3B085C9AB24}">
-                    <p16:designElem xmlns:p16="http://schemas.microsoft.com/office/powerpoint/2015/main" val="1"/>
-                  </p:ext>
-                </p:extLst>
-              </p:nvPr>
-            </p:nvSpPr>
-            <p:spPr>
-              <a:xfrm flipH="1">
-                <a:off x="2328000" y="0"/>
-                <a:ext cx="1440000" cy="1440000"/>
-              </a:xfrm>
-              <a:prstGeom prst="rect">
-                <a:avLst/>
-              </a:prstGeom>
-              <a:gradFill flip="none" rotWithShape="1">
-                <a:gsLst>
-                  <a:gs pos="0">
-                    <a:schemeClr val="accent1"/>
-                  </a:gs>
-                  <a:gs pos="60000">
-                    <a:schemeClr val="accent1">
-                      <a:alpha val="0"/>
-                    </a:schemeClr>
-                  </a:gs>
-                </a:gsLst>
-                <a:path path="circle">
-                  <a:fillToRect r="100000" b="100000"/>
-                </a:path>
-                <a:tileRect l="-100000" t="-100000"/>
-              </a:gradFill>
-              <a:ln w="12700" cap="flat" cmpd="sng" algn="ctr">
-                <a:noFill/>
-                <a:prstDash val="solid"/>
-                <a:miter lim="800000"/>
-              </a:ln>
-              <a:effectLst/>
-            </p:spPr>
-            <p:style>
-              <a:lnRef idx="2">
-                <a:schemeClr val="accent1">
-                  <a:shade val="50000"/>
-                </a:schemeClr>
-              </a:lnRef>
-              <a:fillRef idx="1">
-                <a:schemeClr val="accent1"/>
-              </a:fillRef>
-              <a:effectRef idx="0">
-                <a:schemeClr val="accent1"/>
-              </a:effectRef>
-              <a:fontRef idx="minor">
-                <a:schemeClr val="lt1"/>
-              </a:fontRef>
-            </p:style>
-            <p:txBody>
-              <a:bodyPr rtlCol="0" anchor="ctr"/>
-              <a:lstStyle/>
-              <a:p>
-                <a:pPr algn="r"/>
-                <a:endParaRPr lang="en-US"/>
-              </a:p>
-            </p:txBody>
-          </p:sp>
-        </p:grpSp>
-        <p:grpSp>
-          <p:nvGrpSpPr>
-            <p:cNvPr id="12" name="Group 11">
-              <a:extLst>
-                <a:ext uri="{FF2B5EF4-FFF2-40B4-BE49-F238E27FC236}">
-                  <a16:creationId xmlns:a16="http://schemas.microsoft.com/office/drawing/2014/main" id="{91FBBF95-430B-427C-A6E8-DB899217FC00}"/>
-                </a:ext>
-                <a:ext uri="{C183D7F6-B498-43B3-948B-1728B52AA6E4}">
-                  <adec:decorative xmlns:adec="http://schemas.microsoft.com/office/drawing/2017/decorative" val="1"/>
-                </a:ext>
-              </a:extLst>
-            </p:cNvPr>
-            <p:cNvGrpSpPr>
-              <a:grpSpLocks noChangeAspect="1"/>
-            </p:cNvGrpSpPr>
-            <p:nvPr>
-              <p:extLst>
-                <p:ext uri="{386F3935-93C4-4BCD-93E2-E3B085C9AB24}">
-                  <p16:designElem xmlns:p16="http://schemas.microsoft.com/office/powerpoint/2015/main" val="1"/>
-                </p:ext>
-              </p:extLst>
-            </p:nvPr>
-          </p:nvGrpSpPr>
-          <p:grpSpPr>
-            <a:xfrm rot="5400000">
-              <a:off x="7048499" y="1714500"/>
-              <a:ext cx="6858000" cy="3429000"/>
-              <a:chOff x="0" y="0"/>
-              <a:chExt cx="2880000" cy="1440000"/>
-            </a:xfrm>
-          </p:grpSpPr>
-          <p:sp>
-            <p:nvSpPr>
-              <p:cNvPr id="14" name="Rectangle 13">
-                <a:extLst>
-                  <a:ext uri="{FF2B5EF4-FFF2-40B4-BE49-F238E27FC236}">
-                    <a16:creationId xmlns:a16="http://schemas.microsoft.com/office/drawing/2014/main" id="{BEE64698-3ED2-4395-B7FC-65248E437E0A}"/>
-                  </a:ext>
-                  <a:ext uri="{C183D7F6-B498-43B3-948B-1728B52AA6E4}">
-                    <adec:decorative xmlns:adec="http://schemas.microsoft.com/office/drawing/2017/decorative" val="1"/>
-                  </a:ext>
-                </a:extLst>
-              </p:cNvPr>
-              <p:cNvSpPr/>
-              <p:nvPr>
-                <p:extLst>
-                  <p:ext uri="{386F3935-93C4-4BCD-93E2-E3B085C9AB24}">
-                    <p16:designElem xmlns:p16="http://schemas.microsoft.com/office/powerpoint/2015/main" val="1"/>
-                  </p:ext>
-                </p:extLst>
-              </p:nvPr>
-            </p:nvSpPr>
-            <p:spPr>
-              <a:xfrm>
-                <a:off x="1440000" y="0"/>
-                <a:ext cx="1440000" cy="1440000"/>
-              </a:xfrm>
-              <a:prstGeom prst="rect">
-                <a:avLst/>
-              </a:prstGeom>
-              <a:gradFill flip="none" rotWithShape="1">
-                <a:gsLst>
-                  <a:gs pos="0">
-                    <a:schemeClr val="accent2"/>
-                  </a:gs>
-                  <a:gs pos="60000">
-                    <a:schemeClr val="accent2">
-                      <a:alpha val="0"/>
-                    </a:schemeClr>
-                  </a:gs>
-                </a:gsLst>
-                <a:path path="circle">
-                  <a:fillToRect r="100000" b="100000"/>
-                </a:path>
-                <a:tileRect l="-100000" t="-100000"/>
-              </a:gradFill>
-              <a:ln w="12700" cap="flat" cmpd="sng" algn="ctr">
-                <a:noFill/>
-                <a:prstDash val="solid"/>
-                <a:miter lim="800000"/>
-              </a:ln>
-              <a:effectLst/>
-            </p:spPr>
-            <p:style>
-              <a:lnRef idx="2">
-                <a:schemeClr val="accent1">
-                  <a:shade val="50000"/>
-                </a:schemeClr>
-              </a:lnRef>
-              <a:fillRef idx="1">
-                <a:schemeClr val="accent1"/>
-              </a:fillRef>
-              <a:effectRef idx="0">
-                <a:schemeClr val="accent1"/>
-              </a:effectRef>
-              <a:fontRef idx="minor">
-                <a:schemeClr val="lt1"/>
-              </a:fontRef>
-            </p:style>
-            <p:txBody>
-              <a:bodyPr rtlCol="0" anchor="ctr"/>
-              <a:lstStyle/>
-              <a:p>
-                <a:pPr algn="r"/>
-                <a:endParaRPr lang="en-US"/>
-              </a:p>
-            </p:txBody>
-          </p:sp>
-          <p:sp>
-            <p:nvSpPr>
-              <p:cNvPr id="15" name="Rectangle 14">
-                <a:extLst>
-                  <a:ext uri="{FF2B5EF4-FFF2-40B4-BE49-F238E27FC236}">
-                    <a16:creationId xmlns:a16="http://schemas.microsoft.com/office/drawing/2014/main" id="{FE20B1E1-CE09-4C2A-A3FB-DB8026C54E98}"/>
-                  </a:ext>
-                  <a:ext uri="{C183D7F6-B498-43B3-948B-1728B52AA6E4}">
-                    <adec:decorative xmlns:adec="http://schemas.microsoft.com/office/drawing/2017/decorative" val="1"/>
-                  </a:ext>
-                </a:extLst>
-              </p:cNvPr>
-              <p:cNvSpPr/>
-              <p:nvPr>
-                <p:extLst>
-                  <p:ext uri="{386F3935-93C4-4BCD-93E2-E3B085C9AB24}">
-                    <p16:designElem xmlns:p16="http://schemas.microsoft.com/office/powerpoint/2015/main" val="1"/>
-                  </p:ext>
-                </p:extLst>
-              </p:nvPr>
-            </p:nvSpPr>
-            <p:spPr>
-              <a:xfrm flipH="1">
-                <a:off x="0" y="0"/>
-                <a:ext cx="1440000" cy="1440000"/>
-              </a:xfrm>
-              <a:prstGeom prst="rect">
-                <a:avLst/>
-              </a:prstGeom>
-              <a:gradFill flip="none" rotWithShape="1">
-                <a:gsLst>
-                  <a:gs pos="0">
-                    <a:schemeClr val="accent2"/>
-                  </a:gs>
-                  <a:gs pos="60000">
-                    <a:schemeClr val="accent2">
-                      <a:alpha val="0"/>
-                    </a:schemeClr>
-                  </a:gs>
-                </a:gsLst>
-                <a:path path="circle">
-                  <a:fillToRect r="100000" b="100000"/>
-                </a:path>
-                <a:tileRect l="-100000" t="-100000"/>
-              </a:gradFill>
-              <a:ln w="12700" cap="flat" cmpd="sng" algn="ctr">
-                <a:noFill/>
-                <a:prstDash val="solid"/>
-                <a:miter lim="800000"/>
-              </a:ln>
-              <a:effectLst/>
-            </p:spPr>
-            <p:style>
-              <a:lnRef idx="2">
-                <a:schemeClr val="accent1">
-                  <a:shade val="50000"/>
-                </a:schemeClr>
-              </a:lnRef>
-              <a:fillRef idx="1">
-                <a:schemeClr val="accent1"/>
-              </a:fillRef>
-              <a:effectRef idx="0">
-                <a:schemeClr val="accent1"/>
-              </a:effectRef>
-              <a:fontRef idx="minor">
-                <a:schemeClr val="lt1"/>
-              </a:fontRef>
-            </p:style>
-            <p:txBody>
-              <a:bodyPr rtlCol="0" anchor="ctr"/>
-              <a:lstStyle/>
-              <a:p>
-                <a:pPr algn="r"/>
-                <a:endParaRPr lang="en-US"/>
-              </a:p>
-            </p:txBody>
-          </p:sp>
-        </p:grpSp>
-        <p:sp>
-          <p:nvSpPr>
-            <p:cNvPr id="13" name="Rectangle 12">
-              <a:extLst>
-                <a:ext uri="{FF2B5EF4-FFF2-40B4-BE49-F238E27FC236}">
-                  <a16:creationId xmlns:a16="http://schemas.microsoft.com/office/drawing/2014/main" id="{0CB2405B-A907-48B3-906A-FB3573C0B282}"/>
-                </a:ext>
-                <a:ext uri="{C183D7F6-B498-43B3-948B-1728B52AA6E4}">
-                  <adec:decorative xmlns:adec="http://schemas.microsoft.com/office/drawing/2017/decorative" val="1"/>
-                </a:ext>
-              </a:extLst>
-            </p:cNvPr>
-            <p:cNvSpPr>
-              <a:spLocks noChangeAspect="1"/>
-            </p:cNvSpPr>
-            <p:nvPr>
-              <p:extLst>
-                <p:ext uri="{386F3935-93C4-4BCD-93E2-E3B085C9AB24}">
-                  <p16:designElem xmlns:p16="http://schemas.microsoft.com/office/powerpoint/2015/main" val="1"/>
-                </p:ext>
-              </p:extLst>
-            </p:nvPr>
-          </p:nvSpPr>
-          <p:spPr>
-            <a:xfrm rot="10800000">
-              <a:off x="5602287" y="271887"/>
-              <a:ext cx="6589713" cy="6589713"/>
-            </a:xfrm>
-            <a:prstGeom prst="rect">
-              <a:avLst/>
-            </a:prstGeom>
-            <a:gradFill flip="none" rotWithShape="1">
-              <a:gsLst>
-                <a:gs pos="0">
-                  <a:schemeClr val="accent3"/>
-                </a:gs>
-                <a:gs pos="60000">
-                  <a:schemeClr val="accent3">
-                    <a:alpha val="0"/>
-                  </a:schemeClr>
-                </a:gs>
-              </a:gsLst>
-              <a:path path="circle">
-                <a:fillToRect r="100000" b="100000"/>
-              </a:path>
-              <a:tileRect l="-100000" t="-100000"/>
-            </a:gradFill>
-            <a:ln w="12700" cap="flat" cmpd="sng" algn="ctr">
-              <a:noFill/>
-              <a:prstDash val="solid"/>
-              <a:miter lim="800000"/>
-            </a:ln>
-            <a:effectLst/>
-          </p:spPr>
-          <p:style>
-            <a:lnRef idx="2">
-              <a:schemeClr val="accent1">
-                <a:shade val="50000"/>
-              </a:schemeClr>
-            </a:lnRef>
-            <a:fillRef idx="1">
-              <a:schemeClr val="accent1"/>
-            </a:fillRef>
-            <a:effectRef idx="0">
-              <a:schemeClr val="accent1"/>
-            </a:effectRef>
-            <a:fontRef idx="minor">
-              <a:schemeClr val="lt1"/>
-            </a:fontRef>
-          </p:style>
-          <p:txBody>
-            <a:bodyPr rtlCol="0" anchor="ctr"/>
-            <a:lstStyle/>
-            <a:p>
-              <a:pPr algn="r"/>
-              <a:endParaRPr lang="en-US"/>
-            </a:p>
-          </p:txBody>
-        </p:sp>
-      </p:grpSp>
-      <p:sp>
-        <p:nvSpPr>
-          <p:cNvPr id="19" name="Rectangle 18">
-            <a:extLst>
-              <a:ext uri="{FF2B5EF4-FFF2-40B4-BE49-F238E27FC236}">
-                <a16:creationId xmlns:a16="http://schemas.microsoft.com/office/drawing/2014/main" id="{6DC8E2D9-6729-4614-8667-C1016D3182E4}"/>
-              </a:ext>
-              <a:ext uri="{C183D7F6-B498-43B3-948B-1728B52AA6E4}">
-                <adec:decorative xmlns:adec="http://schemas.microsoft.com/office/drawing/2017/decorative" val="1"/>
-              </a:ext>
-            </a:extLst>
-          </p:cNvPr>
-          <p:cNvSpPr>
-            <a:spLocks noGrp="1" noRot="1" noChangeAspect="1" noMove="1" noResize="1" noEditPoints="1" noAdjustHandles="1" noChangeArrowheads="1" noChangeShapeType="1" noTextEdit="1"/>
-          </p:cNvSpPr>
-          <p:nvPr>
-            <p:extLst>
-              <p:ext uri="{386F3935-93C4-4BCD-93E2-E3B085C9AB24}">
-                <p16:designElem xmlns:p16="http://schemas.microsoft.com/office/powerpoint/2015/main" val="1"/>
-              </p:ext>
-            </p:extLst>
-          </p:nvPr>
-        </p:nvSpPr>
-        <p:spPr>
-          <a:xfrm>
-            <a:off x="0" y="0"/>
-            <a:ext cx="12192000" cy="6858000"/>
-          </a:xfrm>
-          <a:prstGeom prst="rect">
-            <a:avLst/>
-          </a:prstGeom>
-          <a:solidFill>
-            <a:schemeClr val="bg2">
-              <a:alpha val="40000"/>
-            </a:schemeClr>
-          </a:solidFill>
-          <a:ln w="12700" cap="flat" cmpd="sng" algn="ctr">
-            <a:noFill/>
-            <a:prstDash val="solid"/>
-            <a:miter lim="800000"/>
-          </a:ln>
-          <a:effectLst/>
-        </p:spPr>
-        <p:style>
-          <a:lnRef idx="2">
-            <a:schemeClr val="accent1">
-              <a:shade val="50000"/>
-            </a:schemeClr>
-          </a:lnRef>
-          <a:fillRef idx="1">
-            <a:schemeClr val="accent1"/>
-          </a:fillRef>
-          <a:effectRef idx="0">
-            <a:schemeClr val="accent1"/>
-          </a:effectRef>
-          <a:fontRef idx="minor">
-            <a:schemeClr val="lt1"/>
-          </a:fontRef>
-        </p:style>
-        <p:txBody>
-          <a:bodyPr rtlCol="0" anchor="ctr"/>
-          <a:lstStyle/>
-          <a:p>
-            <a:pPr algn="r"/>
-            <a:endParaRPr lang="en-US" dirty="0"/>
-          </a:p>
-        </p:txBody>
-      </p:sp>
-      <p:sp useBgFill="1">
-        <p:nvSpPr>
-          <p:cNvPr id="21" name="Rectangle 20">
-            <a:extLst>
-              <a:ext uri="{FF2B5EF4-FFF2-40B4-BE49-F238E27FC236}">
-                <a16:creationId xmlns:a16="http://schemas.microsoft.com/office/drawing/2014/main" id="{9B9AACA9-BD92-429F-8047-0731DB46F99F}"/>
-              </a:ext>
-              <a:ext uri="{C183D7F6-B498-43B3-948B-1728B52AA6E4}">
-                <adec:decorative xmlns:adec="http://schemas.microsoft.com/office/drawing/2017/decorative" val="1"/>
-              </a:ext>
-            </a:extLst>
-          </p:cNvPr>
-          <p:cNvSpPr>
-            <a:spLocks noGrp="1" noRot="1" noChangeAspect="1" noMove="1" noResize="1" noEditPoints="1" noAdjustHandles="1" noChangeArrowheads="1" noChangeShapeType="1" noTextEdit="1"/>
-          </p:cNvSpPr>
-          <p:nvPr>
-            <p:extLst>
-              <p:ext uri="{386F3935-93C4-4BCD-93E2-E3B085C9AB24}">
-                <p16:designElem xmlns:p16="http://schemas.microsoft.com/office/powerpoint/2015/main" val="1"/>
-              </p:ext>
-            </p:extLst>
-          </p:nvPr>
-        </p:nvSpPr>
-        <p:spPr>
-          <a:xfrm>
-            <a:off x="0" y="0"/>
-            <a:ext cx="12192000" cy="6858000"/>
-          </a:xfrm>
-          <a:prstGeom prst="rect">
-            <a:avLst/>
-          </a:prstGeom>
-          <a:ln w="12700" cap="flat" cmpd="sng" algn="ctr">
-            <a:noFill/>
-            <a:prstDash val="solid"/>
-            <a:miter lim="800000"/>
-          </a:ln>
-          <a:effectLst/>
-        </p:spPr>
-        <p:style>
-          <a:lnRef idx="2">
-            <a:schemeClr val="accent1">
-              <a:shade val="50000"/>
-            </a:schemeClr>
-          </a:lnRef>
-          <a:fillRef idx="1">
-            <a:schemeClr val="accent1"/>
-          </a:fillRef>
-          <a:effectRef idx="0">
-            <a:schemeClr val="accent1"/>
-          </a:effectRef>
-          <a:fontRef idx="minor">
-            <a:schemeClr val="lt1"/>
-          </a:fontRef>
-        </p:style>
-        <p:txBody>
-          <a:bodyPr rtlCol="0" anchor="ctr"/>
-          <a:lstStyle/>
-          <a:p>
-            <a:pPr algn="ctr"/>
-            <a:endParaRPr lang="en-US"/>
-          </a:p>
-        </p:txBody>
-      </p:sp>
-      <p:grpSp>
-        <p:nvGrpSpPr>
-          <p:cNvPr id="23" name="Group 22">
-            <a:extLst>
-              <a:ext uri="{FF2B5EF4-FFF2-40B4-BE49-F238E27FC236}">
-                <a16:creationId xmlns:a16="http://schemas.microsoft.com/office/drawing/2014/main" id="{B046D8F9-B18B-42F5-B320-22E156F4C0C8}"/>
-              </a:ext>
-              <a:ext uri="{C183D7F6-B498-43B3-948B-1728B52AA6E4}">
-                <adec:decorative xmlns:adec="http://schemas.microsoft.com/office/drawing/2017/decorative" val="1"/>
-              </a:ext>
-            </a:extLst>
-          </p:cNvPr>
-          <p:cNvGrpSpPr>
-            <a:grpSpLocks noGrp="1" noUngrp="1" noRot="1" noChangeAspect="1" noMove="1" noResize="1"/>
-          </p:cNvGrpSpPr>
-          <p:nvPr>
-            <p:extLst>
-              <p:ext uri="{386F3935-93C4-4BCD-93E2-E3B085C9AB24}">
-                <p16:designElem xmlns:p16="http://schemas.microsoft.com/office/powerpoint/2015/main" val="1"/>
-              </p:ext>
-            </p:extLst>
-          </p:nvPr>
-        </p:nvGrpSpPr>
-        <p:grpSpPr>
-          <a:xfrm>
-            <a:off x="0" y="0"/>
-            <a:ext cx="12192000" cy="6858000"/>
-            <a:chOff x="0" y="0"/>
-            <a:chExt cx="12192000" cy="6858000"/>
-          </a:xfrm>
-        </p:grpSpPr>
-        <p:sp>
-          <p:nvSpPr>
-            <p:cNvPr id="24" name="Rectangle 23">
-              <a:extLst>
-                <a:ext uri="{FF2B5EF4-FFF2-40B4-BE49-F238E27FC236}">
-                  <a16:creationId xmlns:a16="http://schemas.microsoft.com/office/drawing/2014/main" id="{3980DF08-8878-4A99-871A-573EBF4F37B2}"/>
-                </a:ext>
-                <a:ext uri="{C183D7F6-B498-43B3-948B-1728B52AA6E4}">
-                  <adec:decorative xmlns:adec="http://schemas.microsoft.com/office/drawing/2017/decorative" val="1"/>
-                </a:ext>
-              </a:extLst>
-            </p:cNvPr>
-            <p:cNvSpPr/>
-            <p:nvPr>
-              <p:extLst>
-                <p:ext uri="{386F3935-93C4-4BCD-93E2-E3B085C9AB24}">
-                  <p16:designElem xmlns:p16="http://schemas.microsoft.com/office/powerpoint/2015/main" val="1"/>
-                </p:ext>
-              </p:extLst>
-            </p:nvPr>
-          </p:nvSpPr>
-          <p:spPr>
-            <a:xfrm rot="10800000" flipH="1">
-              <a:off x="0" y="2019649"/>
-              <a:ext cx="4838350" cy="4838350"/>
-            </a:xfrm>
-            <a:prstGeom prst="rect">
-              <a:avLst/>
-            </a:prstGeom>
-            <a:gradFill flip="none" rotWithShape="1">
-              <a:gsLst>
-                <a:gs pos="0">
-                  <a:schemeClr val="accent1"/>
-                </a:gs>
-                <a:gs pos="60000">
-                  <a:schemeClr val="accent1">
-                    <a:alpha val="0"/>
-                  </a:schemeClr>
-                </a:gs>
-              </a:gsLst>
-              <a:path path="circle">
-                <a:fillToRect r="100000" b="100000"/>
-              </a:path>
-              <a:tileRect l="-100000" t="-100000"/>
-            </a:gradFill>
-            <a:ln w="12700" cap="flat" cmpd="sng" algn="ctr">
-              <a:noFill/>
-              <a:prstDash val="solid"/>
-              <a:miter lim="800000"/>
-            </a:ln>
-            <a:effectLst/>
-          </p:spPr>
-          <p:style>
-            <a:lnRef idx="2">
-              <a:schemeClr val="accent1">
-                <a:shade val="50000"/>
-              </a:schemeClr>
-            </a:lnRef>
-            <a:fillRef idx="1">
-              <a:schemeClr val="accent1"/>
-            </a:fillRef>
-            <a:effectRef idx="0">
-              <a:schemeClr val="accent1"/>
-            </a:effectRef>
-            <a:fontRef idx="minor">
-              <a:schemeClr val="lt1"/>
-            </a:fontRef>
-          </p:style>
-          <p:txBody>
-            <a:bodyPr rtlCol="0" anchor="ctr"/>
-            <a:lstStyle/>
-            <a:p>
-              <a:pPr algn="ctr"/>
-              <a:endParaRPr lang="en-US"/>
-            </a:p>
-          </p:txBody>
-        </p:sp>
-        <p:grpSp>
-          <p:nvGrpSpPr>
-            <p:cNvPr id="25" name="Group 24">
-              <a:extLst>
-                <a:ext uri="{FF2B5EF4-FFF2-40B4-BE49-F238E27FC236}">
-                  <a16:creationId xmlns:a16="http://schemas.microsoft.com/office/drawing/2014/main" id="{1E0FF3E7-007F-48E0-8352-89CE4375BB2D}"/>
-                </a:ext>
-                <a:ext uri="{C183D7F6-B498-43B3-948B-1728B52AA6E4}">
-                  <adec:decorative xmlns:adec="http://schemas.microsoft.com/office/drawing/2017/decorative" val="1"/>
-                </a:ext>
-              </a:extLst>
-            </p:cNvPr>
-            <p:cNvGrpSpPr>
-              <a:grpSpLocks noChangeAspect="1"/>
-            </p:cNvGrpSpPr>
-            <p:nvPr>
-              <p:extLst>
-                <p:ext uri="{386F3935-93C4-4BCD-93E2-E3B085C9AB24}">
-                  <p16:designElem xmlns:p16="http://schemas.microsoft.com/office/powerpoint/2015/main" val="1"/>
-                </p:ext>
-              </p:extLst>
-            </p:nvPr>
-          </p:nvGrpSpPr>
-          <p:grpSpPr>
-            <a:xfrm>
-              <a:off x="5603875" y="0"/>
-              <a:ext cx="6521820" cy="3260910"/>
-              <a:chOff x="0" y="0"/>
-              <a:chExt cx="2880000" cy="1440000"/>
-            </a:xfrm>
-          </p:grpSpPr>
-          <p:sp>
-            <p:nvSpPr>
-              <p:cNvPr id="28" name="Rectangle 27">
-                <a:extLst>
-                  <a:ext uri="{FF2B5EF4-FFF2-40B4-BE49-F238E27FC236}">
-                    <a16:creationId xmlns:a16="http://schemas.microsoft.com/office/drawing/2014/main" id="{F02DE4FC-8B38-40C7-A2F5-CBD4C6592E9A}"/>
-                  </a:ext>
-                  <a:ext uri="{C183D7F6-B498-43B3-948B-1728B52AA6E4}">
-                    <adec:decorative xmlns:adec="http://schemas.microsoft.com/office/drawing/2017/decorative" val="1"/>
-                  </a:ext>
-                </a:extLst>
-              </p:cNvPr>
-              <p:cNvSpPr/>
-              <p:nvPr>
-                <p:extLst>
-                  <p:ext uri="{386F3935-93C4-4BCD-93E2-E3B085C9AB24}">
-                    <p16:designElem xmlns:p16="http://schemas.microsoft.com/office/powerpoint/2015/main" val="1"/>
-                  </p:ext>
-                </p:extLst>
-              </p:nvPr>
-            </p:nvSpPr>
-            <p:spPr>
-              <a:xfrm>
-                <a:off x="1440000" y="0"/>
-                <a:ext cx="1440000" cy="1440000"/>
-              </a:xfrm>
-              <a:prstGeom prst="rect">
-                <a:avLst/>
-              </a:prstGeom>
-              <a:gradFill flip="none" rotWithShape="1">
-                <a:gsLst>
-                  <a:gs pos="0">
-                    <a:schemeClr val="accent2"/>
-                  </a:gs>
-                  <a:gs pos="60000">
-                    <a:schemeClr val="accent2">
-                      <a:alpha val="0"/>
-                    </a:schemeClr>
-                  </a:gs>
-                </a:gsLst>
-                <a:path path="circle">
-                  <a:fillToRect r="100000" b="100000"/>
-                </a:path>
-                <a:tileRect l="-100000" t="-100000"/>
-              </a:gradFill>
-              <a:ln w="12700" cap="flat" cmpd="sng" algn="ctr">
-                <a:noFill/>
-                <a:prstDash val="solid"/>
-                <a:miter lim="800000"/>
-              </a:ln>
-              <a:effectLst/>
-            </p:spPr>
-            <p:style>
-              <a:lnRef idx="2">
-                <a:schemeClr val="accent1">
-                  <a:shade val="50000"/>
-                </a:schemeClr>
-              </a:lnRef>
-              <a:fillRef idx="1">
-                <a:schemeClr val="accent1"/>
-              </a:fillRef>
-              <a:effectRef idx="0">
-                <a:schemeClr val="accent1"/>
-              </a:effectRef>
-              <a:fontRef idx="minor">
-                <a:schemeClr val="lt1"/>
-              </a:fontRef>
-            </p:style>
-            <p:txBody>
-              <a:bodyPr rtlCol="0" anchor="ctr"/>
-              <a:lstStyle/>
-              <a:p>
-                <a:pPr algn="ctr"/>
-                <a:endParaRPr lang="en-US"/>
-              </a:p>
-            </p:txBody>
-          </p:sp>
-          <p:sp>
-            <p:nvSpPr>
-              <p:cNvPr id="29" name="Rectangle 28">
-                <a:extLst>
-                  <a:ext uri="{FF2B5EF4-FFF2-40B4-BE49-F238E27FC236}">
-                    <a16:creationId xmlns:a16="http://schemas.microsoft.com/office/drawing/2014/main" id="{5C97C509-DDA4-4291-88B3-8E2B146099AB}"/>
-                  </a:ext>
-                  <a:ext uri="{C183D7F6-B498-43B3-948B-1728B52AA6E4}">
-                    <adec:decorative xmlns:adec="http://schemas.microsoft.com/office/drawing/2017/decorative" val="1"/>
-                  </a:ext>
-                </a:extLst>
-              </p:cNvPr>
-              <p:cNvSpPr/>
-              <p:nvPr>
-                <p:extLst>
-                  <p:ext uri="{386F3935-93C4-4BCD-93E2-E3B085C9AB24}">
-                    <p16:designElem xmlns:p16="http://schemas.microsoft.com/office/powerpoint/2015/main" val="1"/>
-                  </p:ext>
-                </p:extLst>
-              </p:nvPr>
-            </p:nvSpPr>
-            <p:spPr>
-              <a:xfrm flipH="1">
-                <a:off x="0" y="0"/>
-                <a:ext cx="1440000" cy="1440000"/>
-              </a:xfrm>
-              <a:prstGeom prst="rect">
-                <a:avLst/>
-              </a:prstGeom>
-              <a:gradFill flip="none" rotWithShape="1">
-                <a:gsLst>
-                  <a:gs pos="0">
-                    <a:schemeClr val="accent2"/>
-                  </a:gs>
-                  <a:gs pos="60000">
-                    <a:schemeClr val="accent2">
-                      <a:alpha val="0"/>
-                    </a:schemeClr>
-                  </a:gs>
-                </a:gsLst>
-                <a:path path="circle">
-                  <a:fillToRect r="100000" b="100000"/>
-                </a:path>
-                <a:tileRect l="-100000" t="-100000"/>
-              </a:gradFill>
-              <a:ln w="12700" cap="flat" cmpd="sng" algn="ctr">
-                <a:noFill/>
-                <a:prstDash val="solid"/>
-                <a:miter lim="800000"/>
-              </a:ln>
-              <a:effectLst/>
-            </p:spPr>
-            <p:style>
-              <a:lnRef idx="2">
-                <a:schemeClr val="accent1">
-                  <a:shade val="50000"/>
-                </a:schemeClr>
-              </a:lnRef>
-              <a:fillRef idx="1">
-                <a:schemeClr val="accent1"/>
-              </a:fillRef>
-              <a:effectRef idx="0">
-                <a:schemeClr val="accent1"/>
-              </a:effectRef>
-              <a:fontRef idx="minor">
-                <a:schemeClr val="lt1"/>
-              </a:fontRef>
-            </p:style>
-            <p:txBody>
-              <a:bodyPr rtlCol="0" anchor="ctr"/>
-              <a:lstStyle/>
-              <a:p>
-                <a:pPr algn="ctr"/>
-                <a:endParaRPr lang="en-US"/>
-              </a:p>
-            </p:txBody>
-          </p:sp>
-        </p:grpSp>
-        <p:sp>
-          <p:nvSpPr>
-            <p:cNvPr id="26" name="Rectangle 25">
-              <a:extLst>
-                <a:ext uri="{FF2B5EF4-FFF2-40B4-BE49-F238E27FC236}">
-                  <a16:creationId xmlns:a16="http://schemas.microsoft.com/office/drawing/2014/main" id="{96345897-50D9-424E-A94E-18A63AEE85BA}"/>
-                </a:ext>
-                <a:ext uri="{C183D7F6-B498-43B3-948B-1728B52AA6E4}">
-                  <adec:decorative xmlns:adec="http://schemas.microsoft.com/office/drawing/2017/decorative" val="1"/>
-                </a:ext>
-              </a:extLst>
-            </p:cNvPr>
-            <p:cNvSpPr>
-              <a:spLocks noChangeAspect="1"/>
-            </p:cNvSpPr>
-            <p:nvPr>
-              <p:extLst>
-                <p:ext uri="{386F3935-93C4-4BCD-93E2-E3B085C9AB24}">
-                  <p16:designElem xmlns:p16="http://schemas.microsoft.com/office/powerpoint/2015/main" val="1"/>
-                </p:ext>
-              </p:extLst>
-            </p:nvPr>
-          </p:nvSpPr>
-          <p:spPr>
-            <a:xfrm rot="5400000">
-              <a:off x="5334000" y="0"/>
-              <a:ext cx="6858000" cy="6858000"/>
-            </a:xfrm>
-            <a:prstGeom prst="rect">
-              <a:avLst/>
-            </a:prstGeom>
-            <a:gradFill flip="none" rotWithShape="1">
-              <a:gsLst>
-                <a:gs pos="0">
-                  <a:schemeClr val="accent3">
-                    <a:alpha val="60000"/>
-                  </a:schemeClr>
-                </a:gs>
-                <a:gs pos="60000">
-                  <a:schemeClr val="accent3">
-                    <a:alpha val="0"/>
-                  </a:schemeClr>
-                </a:gs>
-              </a:gsLst>
-              <a:path path="circle">
-                <a:fillToRect r="100000" b="100000"/>
-              </a:path>
-              <a:tileRect l="-100000" t="-100000"/>
-            </a:gradFill>
-            <a:ln w="12700" cap="flat" cmpd="sng" algn="ctr">
-              <a:noFill/>
-              <a:prstDash val="solid"/>
-              <a:miter lim="800000"/>
-            </a:ln>
-            <a:effectLst/>
-          </p:spPr>
-          <p:style>
-            <a:lnRef idx="2">
-              <a:schemeClr val="accent1">
-                <a:shade val="50000"/>
-              </a:schemeClr>
-            </a:lnRef>
-            <a:fillRef idx="1">
-              <a:schemeClr val="accent1"/>
-            </a:fillRef>
-            <a:effectRef idx="0">
-              <a:schemeClr val="accent1"/>
-            </a:effectRef>
-            <a:fontRef idx="minor">
-              <a:schemeClr val="lt1"/>
-            </a:fontRef>
-          </p:style>
-          <p:txBody>
-            <a:bodyPr rtlCol="0" anchor="ctr"/>
-            <a:lstStyle/>
-            <a:p>
-              <a:pPr algn="ctr"/>
-              <a:endParaRPr lang="en-US"/>
-            </a:p>
-          </p:txBody>
-        </p:sp>
-        <p:sp>
-          <p:nvSpPr>
-            <p:cNvPr id="27" name="Oval 26">
-              <a:extLst>
-                <a:ext uri="{FF2B5EF4-FFF2-40B4-BE49-F238E27FC236}">
-                  <a16:creationId xmlns:a16="http://schemas.microsoft.com/office/drawing/2014/main" id="{266E6E08-BABA-49E9-884E-4805849158E7}"/>
-                </a:ext>
-                <a:ext uri="{C183D7F6-B498-43B3-948B-1728B52AA6E4}">
-                  <adec:decorative xmlns:adec="http://schemas.microsoft.com/office/drawing/2017/decorative" val="1"/>
-                </a:ext>
-              </a:extLst>
-            </p:cNvPr>
-            <p:cNvSpPr>
-              <a:spLocks noChangeAspect="1"/>
-            </p:cNvSpPr>
-            <p:nvPr>
-              <p:extLst>
-                <p:ext uri="{386F3935-93C4-4BCD-93E2-E3B085C9AB24}">
-                  <p16:designElem xmlns:p16="http://schemas.microsoft.com/office/powerpoint/2015/main" val="1"/>
-                </p:ext>
-              </p:extLst>
-            </p:nvPr>
-          </p:nvSpPr>
-          <p:spPr>
-            <a:xfrm>
-              <a:off x="494887" y="2538000"/>
-              <a:ext cx="4320000" cy="4320000"/>
-            </a:xfrm>
-            <a:prstGeom prst="ellipse">
-              <a:avLst/>
-            </a:prstGeom>
-            <a:solidFill>
-              <a:schemeClr val="accent2">
-                <a:alpha val="20000"/>
-              </a:schemeClr>
-            </a:solidFill>
-            <a:ln>
-              <a:noFill/>
-            </a:ln>
-            <a:effectLst>
-              <a:softEdge rad="1016000"/>
-            </a:effectLst>
-          </p:spPr>
-          <p:style>
-            <a:lnRef idx="2">
-              <a:schemeClr val="accent1">
-                <a:shade val="50000"/>
-              </a:schemeClr>
-            </a:lnRef>
-            <a:fillRef idx="1">
-              <a:schemeClr val="accent1"/>
-            </a:fillRef>
-            <a:effectRef idx="0">
-              <a:schemeClr val="accent1"/>
-            </a:effectRef>
-            <a:fontRef idx="minor">
-              <a:schemeClr val="lt1"/>
-            </a:fontRef>
-          </p:style>
-          <p:txBody>
-            <a:bodyPr rtlCol="0" anchor="ctr"/>
-            <a:lstStyle/>
-            <a:p>
-              <a:pPr algn="ctr"/>
-              <a:endParaRPr lang="en-US"/>
-            </a:p>
-          </p:txBody>
-        </p:sp>
-      </p:grpSp>
-      <p:sp>
-        <p:nvSpPr>
-          <p:cNvPr id="2" name="Title 1">
-            <a:extLst>
-              <a:ext uri="{FF2B5EF4-FFF2-40B4-BE49-F238E27FC236}">
-                <a16:creationId xmlns:a16="http://schemas.microsoft.com/office/drawing/2014/main" id="{B3BB7332-8531-B44C-E058-C0DC9D36A19D}"/>
-              </a:ext>
-            </a:extLst>
-          </p:cNvPr>
-          <p:cNvSpPr>
-            <a:spLocks noGrp="1"/>
-          </p:cNvSpPr>
-          <p:nvPr>
-            <p:ph type="title"/>
-          </p:nvPr>
-        </p:nvSpPr>
-        <p:spPr>
-          <a:xfrm>
-            <a:off x="1487487" y="545126"/>
-            <a:ext cx="9217026" cy="3783988"/>
-          </a:xfrm>
-        </p:spPr>
-        <p:txBody>
-          <a:bodyPr vert="horz" lIns="91440" tIns="45720" rIns="91440" bIns="45720" rtlCol="0" anchor="b">
-            <a:normAutofit/>
-          </a:bodyPr>
-          <a:lstStyle/>
-          <a:p>
-            <a:pPr algn="ctr"/>
-            <a:r>
-              <a:rPr lang="en-US" sz="8800"/>
-              <a:t>Conclusion</a:t>
-            </a:r>
-          </a:p>
-        </p:txBody>
-      </p:sp>
-    </p:spTree>
-    <p:extLst>
-      <p:ext uri="{BB962C8B-B14F-4D97-AF65-F5344CB8AC3E}">
-        <p14:creationId xmlns:p14="http://schemas.microsoft.com/office/powerpoint/2010/main" val="2148325190"/>
-      </p:ext>
-    </p:extLst>
-  </p:cSld>
-  <p:clrMapOvr>
-    <a:masterClrMapping/>
-  </p:clrMapOvr>
-</p:sld>
-</file>
-
 <file path=ppt/theme/theme1.xml><?xml version="1.0" encoding="utf-8"?>
 <a:theme xmlns:a="http://schemas.openxmlformats.org/drawingml/2006/main" name="GlowVTI">
   <a:themeElements>
@@ -18063,6 +16721,15 @@
 </file>
 
 <file path=customXml/item1.xml><?xml version="1.0" encoding="utf-8"?>
+<?mso-contentType ?>
+<FormTemplates xmlns="http://schemas.microsoft.com/sharepoint/v3/contenttype/forms">
+  <Display>DocumentLibraryForm</Display>
+  <Edit>DocumentLibraryForm</Edit>
+  <New>DocumentLibraryForm</New>
+</FormTemplates>
+</file>
+
+<file path=customXml/item2.xml><?xml version="1.0" encoding="utf-8"?>
 <ct:contentTypeSchema xmlns:ct="http://schemas.microsoft.com/office/2006/metadata/contentType" xmlns:ma="http://schemas.microsoft.com/office/2006/metadata/properties/metaAttributes" ct:_="" ma:_="" ma:contentTypeName="Document" ma:contentTypeID="0x01010059B26D64F21B0044927D77352A426B8B" ma:contentTypeVersion="9" ma:contentTypeDescription="Create a new document." ma:contentTypeScope="" ma:versionID="8c4206eb9a799a950f85ec64e459163b">
   <xsd:schema xmlns:xsd="http://www.w3.org/2001/XMLSchema" xmlns:xs="http://www.w3.org/2001/XMLSchema" xmlns:p="http://schemas.microsoft.com/office/2006/metadata/properties" xmlns:ns3="4879b808-c490-45e5-a360-2419182de7d4" xmlns:ns4="7bcdd297-7fcb-434a-97b8-57f07f4bcb0d" targetNamespace="http://schemas.microsoft.com/office/2006/metadata/properties" ma:root="true" ma:fieldsID="0cb99f3a65e05c13b035e8c53c26afac" ns3:_="" ns4:_="">
     <xsd:import namespace="4879b808-c490-45e5-a360-2419182de7d4"/>
@@ -18259,15 +16926,6 @@
 </ct:contentTypeSchema>
 </file>
 
-<file path=customXml/item2.xml><?xml version="1.0" encoding="utf-8"?>
-<?mso-contentType ?>
-<FormTemplates xmlns="http://schemas.microsoft.com/sharepoint/v3/contenttype/forms">
-  <Display>DocumentLibraryForm</Display>
-  <Edit>DocumentLibraryForm</Edit>
-  <New>DocumentLibraryForm</New>
-</FormTemplates>
-</file>
-
 <file path=customXml/item3.xml><?xml version="1.0" encoding="utf-8"?>
 <p:properties xmlns:p="http://schemas.microsoft.com/office/2006/metadata/properties" xmlns:xsi="http://www.w3.org/2001/XMLSchema-instance" xmlns:pc="http://schemas.microsoft.com/office/infopath/2007/PartnerControls">
   <documentManagement/>
@@ -18275,6 +16933,14 @@
 </file>
 
 <file path=customXml/itemProps1.xml><?xml version="1.0" encoding="utf-8"?>
+<ds:datastoreItem xmlns:ds="http://schemas.openxmlformats.org/officeDocument/2006/customXml" ds:itemID="{3B897625-9B67-4055-9C59-7C08141ED1A3}">
+  <ds:schemaRefs>
+    <ds:schemaRef ds:uri="http://schemas.microsoft.com/sharepoint/v3/contenttype/forms"/>
+  </ds:schemaRefs>
+</ds:datastoreItem>
+</file>
+
+<file path=customXml/itemProps2.xml><?xml version="1.0" encoding="utf-8"?>
 <ds:datastoreItem xmlns:ds="http://schemas.openxmlformats.org/officeDocument/2006/customXml" ds:itemID="{2EAD7019-CD4D-4699-A021-B58985C2CC0C}">
   <ds:schemaRefs>
     <ds:schemaRef ds:uri="http://schemas.microsoft.com/office/2006/metadata/contentType"/>
@@ -18289,14 +16955,6 @@
     <ds:schemaRef ds:uri="http://purl.org/dc/elements/1.1/"/>
     <ds:schemaRef ds:uri="http://purl.org/dc/terms/"/>
     <ds:schemaRef ds:uri="http://schemas.microsoft.com/internal/obd"/>
-  </ds:schemaRefs>
-</ds:datastoreItem>
-</file>
-
-<file path=customXml/itemProps2.xml><?xml version="1.0" encoding="utf-8"?>
-<ds:datastoreItem xmlns:ds="http://schemas.openxmlformats.org/officeDocument/2006/customXml" ds:itemID="{3B897625-9B67-4055-9C59-7C08141ED1A3}">
-  <ds:schemaRefs>
-    <ds:schemaRef ds:uri="http://schemas.microsoft.com/sharepoint/v3/contenttype/forms"/>
   </ds:schemaRefs>
 </ds:datastoreItem>
 </file>

</xml_diff>